<commit_message>
Add worker version to title slide
</commit_message>
<xml_diff>
--- a/doc/worker.pptx
+++ b/doc/worker.pptx
@@ -138,7 +138,7 @@
   </p:defaultTextStyle>
   <p:extLst>
     <p:ext uri="{EFAFB233-063F-42B5-8137-9DF3F51BA10A}">
-      <p15:sldGuideLst xmlns:p15="http://schemas.microsoft.com/office/powerpoint/2012/main" xmlns="">
+      <p15:sldGuideLst xmlns:p15="http://schemas.microsoft.com/office/powerpoint/2012/main">
         <p15:guide id="1" orient="horz" pos="2160">
           <p15:clr>
             <a:srgbClr val="A4A3A4"/>
@@ -158,7 +158,7 @@
 <file path=ppt/charts/chart1.xml><?xml version="1.0" encoding="utf-8"?>
 <c:chartSpace xmlns:c="http://schemas.openxmlformats.org/drawingml/2006/chart" xmlns:a="http://schemas.openxmlformats.org/drawingml/2006/main" xmlns:r="http://schemas.openxmlformats.org/officeDocument/2006/relationships">
   <c:date1904 val="0"/>
-  <c:lang val="nl-BE"/>
+  <c:lang val="en-US"/>
   <c:roundedCorners val="0"/>
   <mc:AlternateContent xmlns:mc="http://schemas.openxmlformats.org/markup-compatibility/2006">
     <mc:Choice xmlns:c14="http://schemas.microsoft.com/office/drawing/2007/8/2/chart" Requires="c14">
@@ -265,11 +265,11 @@
           <c:showPercent val="0"/>
           <c:showBubbleSize val="0"/>
         </c:dLbls>
-        <c:axId val="90636672"/>
-        <c:axId val="90638208"/>
+        <c:axId val="335203680"/>
+        <c:axId val="335208776"/>
       </c:scatterChart>
       <c:valAx>
-        <c:axId val="90636672"/>
+        <c:axId val="335203680"/>
         <c:scaling>
           <c:logBase val="2"/>
           <c:orientation val="minMax"/>
@@ -282,13 +282,13 @@
         <c:majorTickMark val="out"/>
         <c:minorTickMark val="none"/>
         <c:tickLblPos val="nextTo"/>
-        <c:crossAx val="90638208"/>
+        <c:crossAx val="335208776"/>
         <c:crosses val="autoZero"/>
         <c:crossBetween val="midCat"/>
         <c:majorUnit val="4"/>
       </c:valAx>
       <c:valAx>
-        <c:axId val="90638208"/>
+        <c:axId val="335208776"/>
         <c:scaling>
           <c:logBase val="2"/>
           <c:orientation val="minMax"/>
@@ -301,7 +301,7 @@
         <c:majorTickMark val="out"/>
         <c:minorTickMark val="none"/>
         <c:tickLblPos val="nextTo"/>
-        <c:crossAx val="90636672"/>
+        <c:crossAx val="335203680"/>
         <c:crosses val="autoZero"/>
         <c:crossBetween val="midCat"/>
         <c:majorUnit val="2"/>
@@ -320,7 +320,7 @@
 <file path=ppt/charts/chart2.xml><?xml version="1.0" encoding="utf-8"?>
 <c:chartSpace xmlns:c="http://schemas.openxmlformats.org/drawingml/2006/chart" xmlns:a="http://schemas.openxmlformats.org/drawingml/2006/main" xmlns:r="http://schemas.openxmlformats.org/officeDocument/2006/relationships">
   <c:date1904 val="0"/>
-  <c:lang val="nl-BE"/>
+  <c:lang val="en-US"/>
   <c:roundedCorners val="0"/>
   <mc:AlternateContent xmlns:mc="http://schemas.openxmlformats.org/markup-compatibility/2006">
     <mc:Choice xmlns:c14="http://schemas.microsoft.com/office/drawing/2007/8/2/chart" Requires="c14">
@@ -427,11 +427,11 @@
           <c:showPercent val="0"/>
           <c:showBubbleSize val="0"/>
         </c:dLbls>
-        <c:axId val="90690688"/>
-        <c:axId val="90692224"/>
+        <c:axId val="335207600"/>
+        <c:axId val="335208384"/>
       </c:scatterChart>
       <c:valAx>
-        <c:axId val="90690688"/>
+        <c:axId val="335207600"/>
         <c:scaling>
           <c:logBase val="2"/>
           <c:orientation val="minMax"/>
@@ -444,14 +444,14 @@
         <c:majorTickMark val="out"/>
         <c:minorTickMark val="none"/>
         <c:tickLblPos val="nextTo"/>
-        <c:crossAx val="90692224"/>
+        <c:crossAx val="335208384"/>
         <c:crosses val="autoZero"/>
         <c:crossBetween val="midCat"/>
         <c:majorUnit val="4"/>
         <c:minorUnit val="4"/>
       </c:valAx>
       <c:valAx>
-        <c:axId val="90692224"/>
+        <c:axId val="335208384"/>
         <c:scaling>
           <c:orientation val="minMax"/>
           <c:max val="1"/>
@@ -463,7 +463,7 @@
         <c:majorTickMark val="out"/>
         <c:minorTickMark val="none"/>
         <c:tickLblPos val="nextTo"/>
-        <c:crossAx val="90690688"/>
+        <c:crossAx val="335207600"/>
         <c:crosses val="autoZero"/>
         <c:crossBetween val="midCat"/>
       </c:valAx>
@@ -560,7 +560,7 @@
           <a:p>
             <a:fld id="{D11149F5-5960-4488-90B9-E5BC4883398F}" type="datetimeFigureOut">
               <a:rPr lang="en-US" smtClean="0"/>
-              <a:t>2015-02-06</a:t>
+              <a:t>2017-10-09</a:t>
             </a:fld>
             <a:endParaRPr lang="en-US"/>
           </a:p>
@@ -3898,7 +3898,7 @@
           <a:p>
             <a:fld id="{8FBE957F-8E2E-442F-A7F0-23C7DDD741A9}" type="datetimeFigureOut">
               <a:rPr lang="en-US" smtClean="0"/>
-              <a:t>2015-02-06</a:t>
+              <a:t>2017-10-09</a:t>
             </a:fld>
             <a:endParaRPr lang="en-US"/>
           </a:p>
@@ -4068,7 +4068,7 @@
           <a:p>
             <a:fld id="{8FBE957F-8E2E-442F-A7F0-23C7DDD741A9}" type="datetimeFigureOut">
               <a:rPr lang="en-US" smtClean="0"/>
-              <a:t>2015-02-06</a:t>
+              <a:t>2017-10-09</a:t>
             </a:fld>
             <a:endParaRPr lang="en-US"/>
           </a:p>
@@ -4248,7 +4248,7 @@
           <a:p>
             <a:fld id="{8FBE957F-8E2E-442F-A7F0-23C7DDD741A9}" type="datetimeFigureOut">
               <a:rPr lang="en-US" smtClean="0"/>
-              <a:t>2015-02-06</a:t>
+              <a:t>2017-10-09</a:t>
             </a:fld>
             <a:endParaRPr lang="en-US"/>
           </a:p>
@@ -4418,7 +4418,7 @@
           <a:p>
             <a:fld id="{8FBE957F-8E2E-442F-A7F0-23C7DDD741A9}" type="datetimeFigureOut">
               <a:rPr lang="en-US" smtClean="0"/>
-              <a:t>2015-02-06</a:t>
+              <a:t>2017-10-09</a:t>
             </a:fld>
             <a:endParaRPr lang="en-US"/>
           </a:p>
@@ -4664,7 +4664,7 @@
           <a:p>
             <a:fld id="{8FBE957F-8E2E-442F-A7F0-23C7DDD741A9}" type="datetimeFigureOut">
               <a:rPr lang="en-US" smtClean="0"/>
-              <a:t>2015-02-06</a:t>
+              <a:t>2017-10-09</a:t>
             </a:fld>
             <a:endParaRPr lang="en-US"/>
           </a:p>
@@ -4952,7 +4952,7 @@
           <a:p>
             <a:fld id="{8FBE957F-8E2E-442F-A7F0-23C7DDD741A9}" type="datetimeFigureOut">
               <a:rPr lang="en-US" smtClean="0"/>
-              <a:t>2015-02-06</a:t>
+              <a:t>2017-10-09</a:t>
             </a:fld>
             <a:endParaRPr lang="en-US"/>
           </a:p>
@@ -5374,7 +5374,7 @@
           <a:p>
             <a:fld id="{8FBE957F-8E2E-442F-A7F0-23C7DDD741A9}" type="datetimeFigureOut">
               <a:rPr lang="en-US" smtClean="0"/>
-              <a:t>2015-02-06</a:t>
+              <a:t>2017-10-09</a:t>
             </a:fld>
             <a:endParaRPr lang="en-US"/>
           </a:p>
@@ -5492,7 +5492,7 @@
           <a:p>
             <a:fld id="{8FBE957F-8E2E-442F-A7F0-23C7DDD741A9}" type="datetimeFigureOut">
               <a:rPr lang="en-US" smtClean="0"/>
-              <a:t>2015-02-06</a:t>
+              <a:t>2017-10-09</a:t>
             </a:fld>
             <a:endParaRPr lang="en-US"/>
           </a:p>
@@ -5587,7 +5587,7 @@
           <a:p>
             <a:fld id="{8FBE957F-8E2E-442F-A7F0-23C7DDD741A9}" type="datetimeFigureOut">
               <a:rPr lang="en-US" smtClean="0"/>
-              <a:t>2015-02-06</a:t>
+              <a:t>2017-10-09</a:t>
             </a:fld>
             <a:endParaRPr lang="en-US"/>
           </a:p>
@@ -5864,7 +5864,7 @@
           <a:p>
             <a:fld id="{8FBE957F-8E2E-442F-A7F0-23C7DDD741A9}" type="datetimeFigureOut">
               <a:rPr lang="en-US" smtClean="0"/>
-              <a:t>2015-02-06</a:t>
+              <a:t>2017-10-09</a:t>
             </a:fld>
             <a:endParaRPr lang="en-US"/>
           </a:p>
@@ -6117,7 +6117,7 @@
           <a:p>
             <a:fld id="{8FBE957F-8E2E-442F-A7F0-23C7DDD741A9}" type="datetimeFigureOut">
               <a:rPr lang="en-US" smtClean="0"/>
-              <a:t>2015-02-06</a:t>
+              <a:t>2017-10-09</a:t>
             </a:fld>
             <a:endParaRPr lang="en-US"/>
           </a:p>
@@ -6330,7 +6330,7 @@
           <a:p>
             <a:fld id="{8FBE957F-8E2E-442F-A7F0-23C7DDD741A9}" type="datetimeFigureOut">
               <a:rPr lang="en-US" smtClean="0"/>
-              <a:t>2015-02-06</a:t>
+              <a:t>2017-10-09</a:t>
             </a:fld>
             <a:endParaRPr lang="en-US"/>
           </a:p>
@@ -6722,10 +6722,10 @@
           <a:p>
             <a:pPr eaLnBrk="1" hangingPunct="1"/>
             <a:r>
-              <a:rPr lang="en-US" smtClean="0"/>
-              <a:t>Worker</a:t>
-            </a:r>
-            <a:endParaRPr lang="nl-BE" smtClean="0"/>
+              <a:rPr lang="en-US" dirty="0" smtClean="0"/>
+              <a:t>Worker 1.6.x</a:t>
+            </a:r>
+            <a:endParaRPr lang="nl-BE" dirty="0" smtClean="0"/>
           </a:p>
         </p:txBody>
       </p:sp>
@@ -21365,7 +21365,7 @@
             <a:graphicData uri="http://schemas.openxmlformats.org/presentationml/2006/ole">
               <mc:AlternateContent xmlns:mc="http://schemas.openxmlformats.org/markup-compatibility/2006">
                 <mc:Choice xmlns:v="urn:schemas-microsoft-com:vml" Requires="v">
-                  <p:oleObj spid="_x0000_s1034" name="Vergelijking" r:id="rId4" imgW="774364" imgH="291973" progId="Equation.3">
+                  <p:oleObj spid="_x0000_s1036" name="Vergelijking" r:id="rId4" imgW="774364" imgH="291973" progId="Equation.3">
                     <p:embed/>
                   </p:oleObj>
                 </mc:Choice>
@@ -22455,7 +22455,7 @@
             <a:graphicData uri="http://schemas.openxmlformats.org/presentationml/2006/ole">
               <mc:AlternateContent xmlns:mc="http://schemas.openxmlformats.org/markup-compatibility/2006">
                 <mc:Choice xmlns:v="urn:schemas-microsoft-com:vml" Requires="v">
-                  <p:oleObj spid="_x0000_s1035" name="Vergelijking" r:id="rId6" imgW="875920" imgH="215806" progId="Equation.3">
+                  <p:oleObj spid="_x0000_s1037" name="Vergelijking" r:id="rId6" imgW="875920" imgH="215806" progId="Equation.3">
                     <p:embed/>
                   </p:oleObj>
                 </mc:Choice>
@@ -25182,7 +25182,7 @@
           <a:graphicData uri="http://schemas.openxmlformats.org/presentationml/2006/ole">
             <mc:AlternateContent xmlns:mc="http://schemas.openxmlformats.org/markup-compatibility/2006">
               <mc:Choice xmlns:v="urn:schemas-microsoft-com:vml" Requires="v">
-                <p:oleObj spid="_x0000_s2058" name="Vergelijking" r:id="rId8" imgW="126780" imgH="164814" progId="Equation.3">
+                <p:oleObj spid="_x0000_s2060" name="Vergelijking" r:id="rId8" imgW="126780" imgH="164814" progId="Equation.3">
                   <p:embed/>
                 </p:oleObj>
               </mc:Choice>
@@ -26241,7 +26241,7 @@
           <a:graphicData uri="http://schemas.openxmlformats.org/presentationml/2006/ole">
             <mc:AlternateContent xmlns:mc="http://schemas.openxmlformats.org/markup-compatibility/2006">
               <mc:Choice xmlns:v="urn:schemas-microsoft-com:vml" Requires="v">
-                <p:oleObj spid="_x0000_s2059" name="Vergelijking" r:id="rId12" imgW="837836" imgH="177723" progId="Equation.3">
+                <p:oleObj spid="_x0000_s2061" name="Vergelijking" r:id="rId12" imgW="837836" imgH="177723" progId="Equation.3">
                   <p:embed/>
                 </p:oleObj>
               </mc:Choice>
@@ -39591,15 +39591,7 @@
             </a:pPr>
             <a:r>
               <a:rPr lang="en-US" dirty="0" smtClean="0"/>
-              <a:t>For </a:t>
-            </a:r>
-            <a:r>
-              <a:rPr lang="en-US" dirty="0" smtClean="0"/>
-              <a:t>thinking, </a:t>
-            </a:r>
-            <a:r>
-              <a:rPr lang="en-US" dirty="0" smtClean="0"/>
-              <a:t>create PBS script ‘my-</a:t>
+              <a:t>For thinking, create PBS script ‘my-</a:t>
             </a:r>
             <a:r>
               <a:rPr lang="en-US" dirty="0" err="1" smtClean="0"/>

</xml_diff>